<commit_message>
alap kész, már csak animálni kell
</commit_message>
<xml_diff>
--- a/BEMUTATÓ.pptx
+++ b/BEMUTATÓ.pptx
@@ -11,6 +11,7 @@
     <p:sldId id="259" r:id="rId5"/>
     <p:sldId id="260" r:id="rId6"/>
     <p:sldId id="261" r:id="rId7"/>
+    <p:sldId id="262" r:id="rId8"/>
   </p:sldIdLst>
   <p:sldSz cx="12192000" cy="6858000"/>
   <p:notesSz cx="6858000" cy="9144000"/>
@@ -7524,6 +7525,7 @@
           </a:bodyPr>
           <a:lstStyle/>
           <a:p>
+            <a:pPr algn="just"/>
             <a:r>
               <a:rPr lang="hu-HU" dirty="0"/>
               <a:t>1. feladat: A file beolvasása, a házak információjáért (alapterület, tulajdonos, stb.) és a fizetendő pénz/m</a:t>
@@ -7534,27 +7536,35 @@
             </a:r>
           </a:p>
           <a:p>
+            <a:pPr algn="just"/>
             <a:endParaRPr lang="hu-HU" baseline="30000" dirty="0"/>
           </a:p>
           <a:p>
+            <a:pPr algn="just"/>
             <a:endParaRPr lang="hu-HU" baseline="30000" dirty="0"/>
           </a:p>
           <a:p>
+            <a:pPr algn="just"/>
             <a:endParaRPr lang="hu-HU" baseline="30000" dirty="0"/>
           </a:p>
           <a:p>
+            <a:pPr algn="just"/>
             <a:endParaRPr lang="hu-HU" baseline="30000" dirty="0"/>
           </a:p>
           <a:p>
+            <a:pPr algn="just"/>
             <a:endParaRPr lang="hu-HU" baseline="30000" dirty="0"/>
           </a:p>
           <a:p>
+            <a:pPr algn="just"/>
             <a:endParaRPr lang="hu-HU" baseline="30000" dirty="0"/>
           </a:p>
           <a:p>
+            <a:pPr algn="just"/>
             <a:endParaRPr lang="hu-HU" baseline="30000" dirty="0"/>
           </a:p>
           <a:p>
+            <a:pPr algn="just"/>
             <a:r>
               <a:rPr lang="hu-HU" dirty="0"/>
               <a:t>2 . feladat: A beolvasott épületek megszámolása a len() </a:t>
@@ -7569,36 +7579,46 @@
             </a:r>
           </a:p>
           <a:p>
+            <a:pPr algn="just"/>
             <a:endParaRPr lang="hu-HU" dirty="0"/>
           </a:p>
           <a:p>
+            <a:pPr algn="just"/>
             <a:endParaRPr lang="hu-HU" dirty="0"/>
           </a:p>
           <a:p>
+            <a:pPr algn="just"/>
             <a:endParaRPr lang="hu-HU" dirty="0"/>
           </a:p>
           <a:p>
+            <a:pPr algn="just"/>
             <a:endParaRPr lang="hu-HU" dirty="0"/>
           </a:p>
           <a:p>
+            <a:pPr algn="just"/>
             <a:endParaRPr lang="hu-HU" dirty="0"/>
           </a:p>
           <a:p>
+            <a:pPr algn="just"/>
             <a:r>
               <a:rPr lang="hu-HU" dirty="0"/>
               <a:t>3. feladat: Be kell kérni egy adószámot és a hozzá tartozó házakat ki kell írni</a:t>
             </a:r>
           </a:p>
           <a:p>
+            <a:pPr algn="just"/>
             <a:endParaRPr lang="hu-HU" dirty="0"/>
           </a:p>
           <a:p>
+            <a:pPr algn="just"/>
             <a:endParaRPr lang="hu-HU" dirty="0"/>
           </a:p>
           <a:p>
+            <a:pPr algn="just"/>
             <a:endParaRPr lang="hu-HU" dirty="0"/>
           </a:p>
           <a:p>
+            <a:pPr algn="just"/>
             <a:endParaRPr lang="hu-HU" dirty="0"/>
           </a:p>
         </p:txBody>
@@ -7998,7 +8018,7 @@
         <p:spPr>
           <a:xfrm>
             <a:off x="485210" y="1083591"/>
-            <a:ext cx="9254407" cy="4247317"/>
+            <a:ext cx="10051362" cy="4247317"/>
           </a:xfrm>
           <a:prstGeom prst="rect">
             <a:avLst/>
@@ -8011,9 +8031,10 @@
           </a:bodyPr>
           <a:lstStyle/>
           <a:p>
+            <a:pPr algn="just"/>
             <a:r>
               <a:rPr lang="hu-HU" dirty="0"/>
-              <a:t>4. Egy számoláshoz szükséges adó </a:t>
+              <a:t>4. feladat: Egy számoláshoz szükséges adó </a:t>
             </a:r>
             <a:r>
               <a:rPr lang="hu-HU" dirty="0" err="1"/>
@@ -8025,27 +8046,34 @@
             </a:r>
           </a:p>
           <a:p>
+            <a:pPr algn="just"/>
             <a:endParaRPr lang="hu-HU" dirty="0"/>
           </a:p>
           <a:p>
+            <a:pPr algn="just"/>
             <a:endParaRPr lang="hu-HU" dirty="0"/>
           </a:p>
           <a:p>
+            <a:pPr algn="just"/>
             <a:endParaRPr lang="hu-HU" dirty="0"/>
           </a:p>
           <a:p>
+            <a:pPr algn="just"/>
             <a:endParaRPr lang="hu-HU" dirty="0"/>
           </a:p>
           <a:p>
+            <a:pPr algn="just"/>
             <a:endParaRPr lang="hu-HU" dirty="0"/>
           </a:p>
           <a:p>
+            <a:pPr algn="just"/>
             <a:endParaRPr lang="hu-HU" dirty="0"/>
           </a:p>
           <a:p>
+            <a:pPr algn="just"/>
             <a:r>
               <a:rPr lang="hu-HU" dirty="0"/>
-              <a:t>5. Az összes háznak az adóját összeadjuk </a:t>
+              <a:t>5. feladat: Az összes háznak az adóját összeadjuk </a:t>
             </a:r>
             <a:r>
               <a:rPr lang="hu-HU" dirty="0" err="1"/>
@@ -8057,21 +8085,26 @@
             </a:r>
           </a:p>
           <a:p>
+            <a:pPr algn="just"/>
             <a:endParaRPr lang="hu-HU" dirty="0"/>
           </a:p>
           <a:p>
+            <a:pPr algn="just"/>
             <a:endParaRPr lang="hu-HU" dirty="0"/>
           </a:p>
           <a:p>
+            <a:pPr algn="just"/>
             <a:endParaRPr lang="hu-HU" dirty="0"/>
           </a:p>
           <a:p>
+            <a:pPr algn="just"/>
             <a:endParaRPr lang="hu-HU" dirty="0"/>
           </a:p>
           <a:p>
+            <a:pPr algn="just"/>
             <a:r>
               <a:rPr lang="hu-HU" dirty="0"/>
-              <a:t>6. Az utcákat kigyűjtjük ami több adósávba esik. Pl. ha az utca1 az A és B adósávba esik akkor ki kell gyűjteni</a:t>
+              <a:t>6. feladat: Az utcákat kigyűjtjük ami több adósávba esik. Pl. ha az utca1 az A és B adósávba esik akkor ki kell gyűjteni</a:t>
             </a:r>
           </a:p>
         </p:txBody>
@@ -8331,6 +8364,42 @@
           <a:chExt cx="0" cy="0"/>
         </a:xfrm>
       </p:grpSpPr>
+      <p:pic>
+        <p:nvPicPr>
+          <p:cNvPr id="5" name="Kép 4">
+            <a:extLst>
+              <a:ext uri="{FF2B5EF4-FFF2-40B4-BE49-F238E27FC236}">
+                <a16:creationId xmlns:a16="http://schemas.microsoft.com/office/drawing/2014/main" id="{CBE911F0-F20A-4073-BF23-F2E63C8A5D16}"/>
+              </a:ext>
+            </a:extLst>
+          </p:cNvPr>
+          <p:cNvPicPr>
+            <a:picLocks noChangeAspect="1"/>
+          </p:cNvPicPr>
+          <p:nvPr/>
+        </p:nvPicPr>
+        <p:blipFill>
+          <a:blip r:embed="rId2">
+            <a:extLst>
+              <a:ext uri="{28A0092B-C50C-407E-A947-70E740481C1C}">
+                <a14:useLocalDpi xmlns:a14="http://schemas.microsoft.com/office/drawing/2010/main" val="0"/>
+              </a:ext>
+            </a:extLst>
+          </a:blip>
+          <a:stretch>
+            <a:fillRect/>
+          </a:stretch>
+        </p:blipFill>
+        <p:spPr>
+          <a:xfrm>
+            <a:off x="0" y="0"/>
+            <a:ext cx="12192000" cy="6858000"/>
+          </a:xfrm>
+          <a:prstGeom prst="rect">
+            <a:avLst/>
+          </a:prstGeom>
+        </p:spPr>
+      </p:pic>
       <p:sp>
         <p:nvSpPr>
           <p:cNvPr id="3" name="Szövegdoboz 2">
@@ -8366,10 +8435,105 @@
           </a:p>
         </p:txBody>
       </p:sp>
+      <p:pic>
+        <p:nvPicPr>
+          <p:cNvPr id="2" name="Kép 1">
+            <a:extLst>
+              <a:ext uri="{FF2B5EF4-FFF2-40B4-BE49-F238E27FC236}">
+                <a16:creationId xmlns:a16="http://schemas.microsoft.com/office/drawing/2014/main" id="{64BCA649-89D7-4883-BF63-2EA6F2E2CDB0}"/>
+              </a:ext>
+            </a:extLst>
+          </p:cNvPr>
+          <p:cNvPicPr>
+            <a:picLocks noChangeAspect="1"/>
+          </p:cNvPicPr>
+          <p:nvPr/>
+        </p:nvPicPr>
+        <p:blipFill>
+          <a:blip r:embed="rId3"/>
+          <a:stretch>
+            <a:fillRect/>
+          </a:stretch>
+        </p:blipFill>
+        <p:spPr>
+          <a:xfrm>
+            <a:off x="6736773" y="0"/>
+            <a:ext cx="5455227" cy="6858000"/>
+          </a:xfrm>
+          <a:prstGeom prst="rect">
+            <a:avLst/>
+          </a:prstGeom>
+        </p:spPr>
+      </p:pic>
     </p:spTree>
     <p:extLst>
       <p:ext uri="{BB962C8B-B14F-4D97-AF65-F5344CB8AC3E}">
         <p14:creationId xmlns:p14="http://schemas.microsoft.com/office/powerpoint/2010/main" val="1102577553"/>
+      </p:ext>
+    </p:extLst>
+  </p:cSld>
+  <p:clrMapOvr>
+    <a:masterClrMapping/>
+  </p:clrMapOvr>
+</p:sld>
+</file>
+
+<file path=ppt/slides/slide7.xml><?xml version="1.0" encoding="utf-8"?>
+<p:sld xmlns:a="http://schemas.openxmlformats.org/drawingml/2006/main" xmlns:r="http://schemas.openxmlformats.org/officeDocument/2006/relationships" xmlns:p="http://schemas.openxmlformats.org/presentationml/2006/main">
+  <p:cSld>
+    <p:spTree>
+      <p:nvGrpSpPr>
+        <p:cNvPr id="1" name=""/>
+        <p:cNvGrpSpPr/>
+        <p:nvPr/>
+      </p:nvGrpSpPr>
+      <p:grpSpPr>
+        <a:xfrm>
+          <a:off x="0" y="0"/>
+          <a:ext cx="0" cy="0"/>
+          <a:chOff x="0" y="0"/>
+          <a:chExt cx="0" cy="0"/>
+        </a:xfrm>
+      </p:grpSpPr>
+      <p:sp>
+        <p:nvSpPr>
+          <p:cNvPr id="2" name="Szövegdoboz 1">
+            <a:extLst>
+              <a:ext uri="{FF2B5EF4-FFF2-40B4-BE49-F238E27FC236}">
+                <a16:creationId xmlns:a16="http://schemas.microsoft.com/office/drawing/2014/main" id="{ED3E5903-F004-4CBD-B3BD-A7DC855B799C}"/>
+              </a:ext>
+            </a:extLst>
+          </p:cNvPr>
+          <p:cNvSpPr txBox="1"/>
+          <p:nvPr/>
+        </p:nvSpPr>
+        <p:spPr>
+          <a:xfrm>
+            <a:off x="1795175" y="2828835"/>
+            <a:ext cx="8601650" cy="1200329"/>
+          </a:xfrm>
+          <a:prstGeom prst="rect">
+            <a:avLst/>
+          </a:prstGeom>
+          <a:noFill/>
+        </p:spPr>
+        <p:txBody>
+          <a:bodyPr wrap="none" rtlCol="0">
+            <a:spAutoFit/>
+          </a:bodyPr>
+          <a:lstStyle/>
+          <a:p>
+            <a:r>
+              <a:rPr lang="hu-HU" sz="7200" dirty="0"/>
+              <a:t>Köszönjük a figyelmet!</a:t>
+            </a:r>
+          </a:p>
+        </p:txBody>
+      </p:sp>
+    </p:spTree>
+    <p:extLst>
+      <p:ext uri="{BB962C8B-B14F-4D97-AF65-F5344CB8AC3E}">
+        <p14:creationId xmlns:p14="http://schemas.microsoft.com/office/powerpoint/2010/main" val="3738903152"/>
       </p:ext>
     </p:extLst>
   </p:cSld>

</xml_diff>